<commit_message>
CPP grammar ported to Java (must resolve ambiguities)
Signed-off-by: robin-jarry <robin.jarry@gmail.com>
</commit_message>
<xml_diff>
--- a/_docs/Presentation memoire ingenieur.pptx
+++ b/_docs/Presentation memoire ingenieur.pptx
@@ -201,7 +201,7 @@
             <a:fld id="{A7959C71-B73A-49FF-9308-B24F710812B5}" type="datetimeFigureOut">
               <a:rPr lang="fr-FR" smtClean="0"/>
               <a:pPr/>
-              <a:t>29/01/2013</a:t>
+              <a:t>01/02/2013</a:t>
             </a:fld>
             <a:endParaRPr lang="fr-FR" dirty="0"/>
           </a:p>
@@ -687,7 +687,7 @@
             <a:fld id="{5468FC2B-D455-4AC4-9C5E-9317124768F4}" type="datetimeFigureOut">
               <a:rPr lang="fr-FR" smtClean="0"/>
               <a:pPr/>
-              <a:t>29/01/2013</a:t>
+              <a:t>01/02/2013</a:t>
             </a:fld>
             <a:endParaRPr lang="fr-FR" dirty="0"/>
           </a:p>
@@ -836,7 +836,7 @@
             <a:fld id="{5468FC2B-D455-4AC4-9C5E-9317124768F4}" type="datetimeFigureOut">
               <a:rPr lang="fr-FR" smtClean="0"/>
               <a:pPr/>
-              <a:t>29/01/2013</a:t>
+              <a:t>01/02/2013</a:t>
             </a:fld>
             <a:endParaRPr lang="fr-FR" dirty="0"/>
           </a:p>
@@ -985,7 +985,7 @@
             <a:fld id="{5468FC2B-D455-4AC4-9C5E-9317124768F4}" type="datetimeFigureOut">
               <a:rPr lang="fr-FR" smtClean="0"/>
               <a:pPr/>
-              <a:t>29/01/2013</a:t>
+              <a:t>01/02/2013</a:t>
             </a:fld>
             <a:endParaRPr lang="fr-FR" dirty="0"/>
           </a:p>
@@ -1134,7 +1134,7 @@
             <a:fld id="{5468FC2B-D455-4AC4-9C5E-9317124768F4}" type="datetimeFigureOut">
               <a:rPr lang="fr-FR" smtClean="0"/>
               <a:pPr/>
-              <a:t>29/01/2013</a:t>
+              <a:t>01/02/2013</a:t>
             </a:fld>
             <a:endParaRPr lang="fr-FR" dirty="0"/>
           </a:p>
@@ -4044,7 +4044,6 @@
               <a:rPr lang="fr-FR" sz="2500" dirty="0" smtClean="0"/>
               <a:t>Compatible JDBC</a:t>
             </a:r>
-            <a:endParaRPr lang="fr-FR" sz="2500" dirty="0" smtClean="0"/>
           </a:p>
           <a:p>
             <a:r>
@@ -5255,11 +5254,6 @@
               </a:rPr>
               <a:t> »</a:t>
             </a:r>
-            <a:endParaRPr lang="fr-FR" sz="2500" b="1" i="1" dirty="0" smtClean="0">
-              <a:solidFill>
-                <a:srgbClr val="0089FA"/>
-              </a:solidFill>
-            </a:endParaRPr>
           </a:p>
           <a:p>
             <a:r>
@@ -5404,7 +5398,6 @@
               <a:rPr lang="fr-FR" sz="2500" dirty="0" smtClean="0"/>
               <a:t>Contribution active</a:t>
             </a:r>
-            <a:endParaRPr lang="fr-FR" sz="2500" dirty="0" smtClean="0"/>
           </a:p>
         </p:txBody>
       </p:sp>
@@ -5937,11 +5930,6 @@
               </a:rPr>
               <a:t>API</a:t>
             </a:r>
-            <a:endParaRPr lang="fr-FR" sz="2700" b="1" dirty="0" smtClean="0">
-              <a:solidFill>
-                <a:srgbClr val="0089FA"/>
-              </a:solidFill>
-            </a:endParaRPr>
           </a:p>
         </p:txBody>
       </p:sp>
@@ -6193,10 +6181,6 @@
                 </a:rPr>
                 <a:t>(): String[]</a:t>
               </a:r>
-              <a:endParaRPr lang="fr-FR" sz="1200" dirty="0" smtClean="0">
-                <a:latin typeface="Courier New" pitchFamily="49" charset="0"/>
-                <a:cs typeface="Courier New" pitchFamily="49" charset="0"/>
-              </a:endParaRPr>
             </a:p>
           </p:txBody>
         </p:sp>
@@ -7693,29 +7677,6 @@
               </a:rPr>
               <a:t>?</a:t>
             </a:r>
-            <a:endParaRPr lang="fr-FR" sz="19900" dirty="0">
-              <a:gradFill>
-                <a:gsLst>
-                  <a:gs pos="0">
-                    <a:srgbClr val="0052AC"/>
-                  </a:gs>
-                  <a:gs pos="100000">
-                    <a:srgbClr val="2FA1FF"/>
-                  </a:gs>
-                </a:gsLst>
-                <a:lin ang="18900000" scaled="1"/>
-              </a:gradFill>
-              <a:effectLst>
-                <a:outerShdw blurRad="50800" dist="38100" dir="2700000" algn="tl" rotWithShape="0">
-                  <a:prstClr val="black">
-                    <a:alpha val="24000"/>
-                  </a:prstClr>
-                </a:outerShdw>
-              </a:effectLst>
-              <a:latin typeface="+mj-lt"/>
-              <a:ea typeface="+mj-ea"/>
-              <a:cs typeface="+mj-cs"/>
-            </a:endParaRPr>
           </a:p>
         </p:txBody>
       </p:sp>
@@ -17872,11 +17833,7 @@
             <a:pPr algn="ctr"/>
             <a:r>
               <a:rPr lang="fr-FR" dirty="0" smtClean="0"/>
-              <a:t>v2.0 </a:t>
-            </a:r>
-            <a:r>
-              <a:rPr lang="fr-FR" dirty="0" smtClean="0"/>
-              <a:t>API</a:t>
+              <a:t>v2.0 API</a:t>
             </a:r>
             <a:endParaRPr lang="fr-FR" dirty="0"/>
           </a:p>
@@ -19831,6 +19788,14 @@
 </file>
 
 <file path=customXml/item1.xml><?xml version="1.0" encoding="utf-8"?>
+<ct:contentTypeSchema xmlns:ct="http://schemas.microsoft.com/office/2006/metadata/contentType" xmlns:ma="http://schemas.microsoft.com/office/2006/metadata/properties/metaAttributes" ct:_="" ma:_="" ma:contentTypeName="TemplateFile" ma:contentTypeID="0x01010069924D1ECC420D47A2456556BC94F7370400BDF4491DEA4973499845289601F88B9F" ma:contentTypeVersion="28" ma:contentTypeDescription="Create a new document." ma:contentTypeScope="" ma:versionID="3734922cae638a1d4f2b3c9f45d0aea3"/>
+</file>
+
+<file path=customXml/item2.xml><?xml version="1.0" encoding="utf-8"?>
+<p:properties xmlns:p="http://schemas.microsoft.com/office/2006/metadata/properties" xmlns:xsi="http://www.w3.org/2001/XMLSchema-instance" xmlns:pc="http://schemas.microsoft.com/office/infopath/2007/PartnerControls"/>
+</file>
+
+<file path=customXml/item3.xml><?xml version="1.0" encoding="utf-8"?>
 <?mso-contentType ?>
 <FormTemplates xmlns="http://schemas.microsoft.com/sharepoint/v3/contenttype/forms">
   <Display>DocumentLibraryForm</Display>
@@ -19839,18 +19804,11 @@
 </FormTemplates>
 </file>
 
-<file path=customXml/item2.xml><?xml version="1.0" encoding="utf-8"?>
-<p:properties xmlns:p="http://schemas.microsoft.com/office/2006/metadata/properties" xmlns:xsi="http://www.w3.org/2001/XMLSchema-instance" xmlns:pc="http://schemas.microsoft.com/office/infopath/2007/PartnerControls"/>
-</file>
-
-<file path=customXml/item3.xml><?xml version="1.0" encoding="utf-8"?>
-<ct:contentTypeSchema xmlns:ct="http://schemas.microsoft.com/office/2006/metadata/contentType" xmlns:ma="http://schemas.microsoft.com/office/2006/metadata/properties/metaAttributes" ct:_="" ma:_="" ma:contentTypeName="TemplateFile" ma:contentTypeID="0x01010069924D1ECC420D47A2456556BC94F7370400BDF4491DEA4973499845289601F88B9F" ma:contentTypeVersion="28" ma:contentTypeDescription="Create a new document." ma:contentTypeScope="" ma:versionID="3734922cae638a1d4f2b3c9f45d0aea3"/>
-</file>
-
 <file path=customXml/itemProps1.xml><?xml version="1.0" encoding="utf-8"?>
-<ds:datastoreItem xmlns:ds="http://schemas.openxmlformats.org/officeDocument/2006/customXml" ds:itemID="{D9755060-407B-4BA3-9693-FA43109E1D3A}">
+<ds:datastoreItem xmlns:ds="http://schemas.openxmlformats.org/officeDocument/2006/customXml" ds:itemID="{06513FD4-B044-4B8A-8BD2-C787E2AA39E4}">
   <ds:schemaRefs>
-    <ds:schemaRef ds:uri="http://schemas.microsoft.com/sharepoint/v3/contenttype/forms"/>
+    <ds:schemaRef ds:uri="http://schemas.microsoft.com/office/2006/metadata/contentType"/>
+    <ds:schemaRef ds:uri="http://schemas.microsoft.com/office/2006/metadata/properties/metaAttributes"/>
   </ds:schemaRefs>
 </ds:datastoreItem>
 </file>
@@ -19865,10 +19823,9 @@
 </file>
 
 <file path=customXml/itemProps3.xml><?xml version="1.0" encoding="utf-8"?>
-<ds:datastoreItem xmlns:ds="http://schemas.openxmlformats.org/officeDocument/2006/customXml" ds:itemID="{06513FD4-B044-4B8A-8BD2-C787E2AA39E4}">
+<ds:datastoreItem xmlns:ds="http://schemas.openxmlformats.org/officeDocument/2006/customXml" ds:itemID="{D9755060-407B-4BA3-9693-FA43109E1D3A}">
   <ds:schemaRefs>
-    <ds:schemaRef ds:uri="http://schemas.microsoft.com/office/2006/metadata/contentType"/>
-    <ds:schemaRef ds:uri="http://schemas.microsoft.com/office/2006/metadata/properties/metaAttributes"/>
+    <ds:schemaRef ds:uri="http://schemas.microsoft.com/sharepoint/v3/contenttype/forms"/>
   </ds:schemaRefs>
 </ds:datastoreItem>
 </file>
</xml_diff>